<commit_message>
Carol's slide has been added
</commit_message>
<xml_diff>
--- a/DRAFT-InitialPresentation.pptx
+++ b/DRAFT-InitialPresentation.pptx
@@ -5,7 +5,7 @@
     <p:sldMasterId id="2147483648" r:id="rId1"/>
   </p:sldMasterIdLst>
   <p:notesMasterIdLst>
-    <p:notesMasterId r:id="rId8"/>
+    <p:notesMasterId r:id="rId9"/>
   </p:notesMasterIdLst>
   <p:sldIdLst>
     <p:sldId id="256" r:id="rId2"/>
@@ -14,6 +14,7 @@
     <p:sldId id="258" r:id="rId5"/>
     <p:sldId id="259" r:id="rId6"/>
     <p:sldId id="260" r:id="rId7"/>
+    <p:sldId id="262" r:id="rId8"/>
   </p:sldIdLst>
   <p:sldSz cx="9144000" cy="6858000" type="screen4x3"/>
   <p:notesSz cx="6858000" cy="9144000"/>
@@ -173,6 +174,11 @@
         </p:txBody>
       </p:sp>
     </p:spTree>
+    <p:extLst>
+      <p:ext uri="{BB962C8B-B14F-4D97-AF65-F5344CB8AC3E}">
+        <p14:creationId xmlns:p14="http://schemas.microsoft.com/office/powerpoint/2010/main" val="4280045320"/>
+      </p:ext>
+    </p:extLst>
   </p:cSld>
   <p:clrMap bg1="lt1" tx1="dk1" bg2="lt2" tx2="dk2" accent1="accent1" accent2="accent2" accent3="accent3" accent4="accent4" accent5="accent5" accent6="accent6" hlink="hlink" folHlink="folHlink"/>
   <p:notesStyle>
@@ -523,7 +529,7 @@
   <p:clrMapOvr>
     <a:masterClrMapping/>
   </p:clrMapOvr>
-  <p:transition spd="med"/>
+  <p:transition xmlns:p14="http://schemas.microsoft.com/office/powerpoint/2010/main" spd="med"/>
 </p:sldLayout>
 </file>
 
@@ -672,7 +678,7 @@
   <p:clrMapOvr>
     <a:masterClrMapping/>
   </p:clrMapOvr>
-  <p:transition spd="med"/>
+  <p:transition xmlns:p14="http://schemas.microsoft.com/office/powerpoint/2010/main" spd="med"/>
 </p:sldLayout>
 </file>
 
@@ -829,7 +835,7 @@
   <p:clrMapOvr>
     <a:masterClrMapping/>
   </p:clrMapOvr>
-  <p:transition spd="med"/>
+  <p:transition xmlns:p14="http://schemas.microsoft.com/office/powerpoint/2010/main" spd="med"/>
 </p:sldLayout>
 </file>
 
@@ -978,7 +984,7 @@
   <p:clrMapOvr>
     <a:masterClrMapping/>
   </p:clrMapOvr>
-  <p:transition spd="med"/>
+  <p:transition xmlns:p14="http://schemas.microsoft.com/office/powerpoint/2010/main" spd="med"/>
 </p:sldLayout>
 </file>
 
@@ -1245,7 +1251,7 @@
   <p:clrMapOvr>
     <a:masterClrMapping/>
   </p:clrMapOvr>
-  <p:transition spd="med"/>
+  <p:transition xmlns:p14="http://schemas.microsoft.com/office/powerpoint/2010/main" spd="med"/>
 </p:sldLayout>
 </file>
 
@@ -1429,7 +1435,7 @@
   <p:clrMapOvr>
     <a:masterClrMapping/>
   </p:clrMapOvr>
-  <p:transition spd="med"/>
+  <p:transition xmlns:p14="http://schemas.microsoft.com/office/powerpoint/2010/main" spd="med"/>
 </p:sldLayout>
 </file>
 
@@ -1632,7 +1638,7 @@
   <p:clrMapOvr>
     <a:masterClrMapping/>
   </p:clrMapOvr>
-  <p:transition spd="med"/>
+  <p:transition xmlns:p14="http://schemas.microsoft.com/office/powerpoint/2010/main" spd="med"/>
 </p:sldLayout>
 </file>
 
@@ -1716,7 +1722,7 @@
   <p:clrMapOvr>
     <a:masterClrMapping/>
   </p:clrMapOvr>
-  <p:transition spd="med"/>
+  <p:transition xmlns:p14="http://schemas.microsoft.com/office/powerpoint/2010/main" spd="med"/>
 </p:sldLayout>
 </file>
 
@@ -1771,7 +1777,7 @@
   <p:clrMapOvr>
     <a:masterClrMapping/>
   </p:clrMapOvr>
-  <p:transition spd="med"/>
+  <p:transition xmlns:p14="http://schemas.microsoft.com/office/powerpoint/2010/main" spd="med"/>
 </p:sldLayout>
 </file>
 
@@ -1932,7 +1938,7 @@
   <p:clrMapOvr>
     <a:masterClrMapping/>
   </p:clrMapOvr>
-  <p:transition spd="med"/>
+  <p:transition xmlns:p14="http://schemas.microsoft.com/office/powerpoint/2010/main" spd="med"/>
 </p:sldLayout>
 </file>
 
@@ -2139,7 +2145,7 @@
   <p:clrMapOvr>
     <a:masterClrMapping/>
   </p:clrMapOvr>
-  <p:transition spd="med"/>
+  <p:transition xmlns:p14="http://schemas.microsoft.com/office/powerpoint/2010/main" spd="med"/>
 </p:sldLayout>
 </file>
 
@@ -2191,7 +2197,7 @@
           </a:ln>
           <a:extLst>
             <a:ext uri="{C572A759-6A51-4108-AA02-DFA0A04FC94B}">
-              <ma14:wrappingTextBoxFlag xmlns="" xmlns:ma14="http://schemas.microsoft.com/office/mac/drawingml/2011/main" val="1"/>
+              <ma14:wrappingTextBoxFlag xmlns:ma14="http://schemas.microsoft.com/office/mac/drawingml/2011/main" val="1"/>
             </a:ext>
           </a:extLst>
         </p:spPr>
@@ -2234,7 +2240,7 @@
           </a:ln>
           <a:extLst>
             <a:ext uri="{C572A759-6A51-4108-AA02-DFA0A04FC94B}">
-              <ma14:wrappingTextBoxFlag xmlns="" xmlns:ma14="http://schemas.microsoft.com/office/mac/drawingml/2011/main" val="1"/>
+              <ma14:wrappingTextBoxFlag xmlns:ma14="http://schemas.microsoft.com/office/mac/drawingml/2011/main" val="1"/>
             </a:ext>
           </a:extLst>
         </p:spPr>
@@ -2352,7 +2358,7 @@
     <p:sldLayoutId id="2147483658" r:id="rId10"/>
     <p:sldLayoutId id="2147483659" r:id="rId11"/>
   </p:sldLayoutIdLst>
-  <p:transition spd="med"/>
+  <p:transition xmlns:p14="http://schemas.microsoft.com/office/powerpoint/2010/main" spd="med"/>
   <p:txStyles>
     <p:titleStyle>
       <a:lvl1pPr algn="ctr">
@@ -2803,7 +2809,7 @@
   <p:clrMapOvr>
     <a:masterClrMapping/>
   </p:clrMapOvr>
-  <p:transition spd="med"/>
+  <p:transition xmlns:p14="http://schemas.microsoft.com/office/powerpoint/2010/main" spd="med"/>
 </p:sld>
 </file>
 
@@ -3035,7 +3041,7 @@
   <p:clrMapOvr>
     <a:masterClrMapping/>
   </p:clrMapOvr>
-  <p:transition spd="med"/>
+  <p:transition xmlns:p14="http://schemas.microsoft.com/office/powerpoint/2010/main" spd="med"/>
 </p:sld>
 </file>
 
@@ -3118,7 +3124,7 @@
   <p:clrMapOvr>
     <a:masterClrMapping/>
   </p:clrMapOvr>
-  <p:transition spd="med"/>
+  <p:transition xmlns:p14="http://schemas.microsoft.com/office/powerpoint/2010/main" spd="med"/>
 </p:sld>
 </file>
 
@@ -3227,7 +3233,7 @@
           </a:prstGeom>
           <a:extLst>
             <a:ext uri="{C572A759-6A51-4108-AA02-DFA0A04FC94B}">
-              <ma14:wrappingTextBoxFlag xmlns="" xmlns:ma14="http://schemas.microsoft.com/office/mac/drawingml/2011/main" val="1"/>
+              <ma14:wrappingTextBoxFlag xmlns:ma14="http://schemas.microsoft.com/office/mac/drawingml/2011/main" val="1"/>
             </a:ext>
           </a:extLst>
         </p:spPr>
@@ -3270,7 +3276,7 @@
   <p:clrMapOvr>
     <a:masterClrMapping/>
   </p:clrMapOvr>
-  <p:transition spd="med"/>
+  <p:transition xmlns:p14="http://schemas.microsoft.com/office/powerpoint/2010/main" spd="med"/>
 </p:sld>
 </file>
 
@@ -3365,7 +3371,7 @@
           </a:prstGeom>
           <a:extLst>
             <a:ext uri="{C572A759-6A51-4108-AA02-DFA0A04FC94B}">
-              <ma14:wrappingTextBoxFlag xmlns="" xmlns:ma14="http://schemas.microsoft.com/office/mac/drawingml/2011/main" val="1"/>
+              <ma14:wrappingTextBoxFlag xmlns:ma14="http://schemas.microsoft.com/office/mac/drawingml/2011/main" val="1"/>
             </a:ext>
           </a:extLst>
         </p:spPr>
@@ -3408,7 +3414,7 @@
   <p:clrMapOvr>
     <a:masterClrMapping/>
   </p:clrMapOvr>
-  <p:transition spd="med"/>
+  <p:transition xmlns:p14="http://schemas.microsoft.com/office/powerpoint/2010/main" spd="med"/>
 </p:sld>
 </file>
 
@@ -3452,7 +3458,7 @@
               <a:defRPr sz="1800"/>
             </a:pPr>
             <a:r>
-              <a:rPr sz="4400"/>
+              <a:rPr sz="4400" dirty="0"/>
               <a:t>Timothy Ma</a:t>
             </a:r>
           </a:p>
@@ -3481,7 +3487,7 @@
               <a:defRPr sz="1800"/>
             </a:pPr>
             <a:r>
-              <a:rPr sz="3200"/>
+              <a:rPr sz="3200" dirty="0"/>
               <a:t>Timothy Ma, a senior year from College 9/10. A Computer Science major with a minor in Technology and Information Management. Worked at a start-up company called Synqy over this past summer, and help build a database of potential customers for them.</a:t>
             </a:r>
           </a:p>
@@ -3503,7 +3509,7 @@
           </a:prstGeom>
           <a:extLst>
             <a:ext uri="{C572A759-6A51-4108-AA02-DFA0A04FC94B}">
-              <ma14:wrappingTextBoxFlag xmlns="" xmlns:ma14="http://schemas.microsoft.com/office/mac/drawingml/2011/main" val="1"/>
+              <ma14:wrappingTextBoxFlag xmlns:ma14="http://schemas.microsoft.com/office/mac/drawingml/2011/main" val="1"/>
             </a:ext>
           </a:extLst>
         </p:spPr>
@@ -3546,7 +3552,145 @@
   <p:clrMapOvr>
     <a:masterClrMapping/>
   </p:clrMapOvr>
-  <p:transition spd="med"/>
+  <p:transition xmlns:p14="http://schemas.microsoft.com/office/powerpoint/2010/main" spd="med"/>
+</p:sld>
+</file>
+
+<file path=ppt/slides/slide7.xml><?xml version="1.0" encoding="utf-8"?>
+<p:sld xmlns:a="http://schemas.openxmlformats.org/drawingml/2006/main" xmlns:r="http://schemas.openxmlformats.org/officeDocument/2006/relationships" xmlns:p="http://schemas.openxmlformats.org/presentationml/2006/main">
+  <p:cSld>
+    <p:spTree>
+      <p:nvGrpSpPr>
+        <p:cNvPr id="1" name=""/>
+        <p:cNvGrpSpPr/>
+        <p:nvPr/>
+      </p:nvGrpSpPr>
+      <p:grpSpPr>
+        <a:xfrm>
+          <a:off x="0" y="0"/>
+          <a:ext cx="0" cy="0"/>
+          <a:chOff x="0" y="0"/>
+          <a:chExt cx="0" cy="0"/>
+        </a:xfrm>
+      </p:grpSpPr>
+      <p:sp>
+        <p:nvSpPr>
+          <p:cNvPr id="2" name="Title 1"/>
+          <p:cNvSpPr>
+            <a:spLocks noGrp="1"/>
+          </p:cNvSpPr>
+          <p:nvPr>
+            <p:ph type="title"/>
+          </p:nvPr>
+        </p:nvSpPr>
+        <p:spPr/>
+        <p:txBody>
+          <a:bodyPr/>
+          <a:lstStyle/>
+          <a:p>
+            <a:r>
+              <a:rPr lang="en-US" dirty="0" smtClean="0"/>
+              <a:t>	Carol Figueroa</a:t>
+            </a:r>
+            <a:endParaRPr lang="en-US" dirty="0"/>
+          </a:p>
+        </p:txBody>
+      </p:sp>
+      <p:sp>
+        <p:nvSpPr>
+          <p:cNvPr id="3" name="Text Placeholder 2"/>
+          <p:cNvSpPr>
+            <a:spLocks noGrp="1"/>
+          </p:cNvSpPr>
+          <p:nvPr>
+            <p:ph type="body" idx="1"/>
+          </p:nvPr>
+        </p:nvSpPr>
+        <p:spPr/>
+        <p:txBody>
+          <a:bodyPr/>
+          <a:lstStyle/>
+          <a:p>
+            <a:pPr marL="0" indent="0">
+              <a:buNone/>
+            </a:pPr>
+            <a:r>
+              <a:rPr lang="en-US" dirty="0" smtClean="0"/>
+              <a:t>Carol is a 5</a:t>
+            </a:r>
+            <a:r>
+              <a:rPr lang="en-US" baseline="30000" dirty="0" smtClean="0"/>
+              <a:t>th</a:t>
+            </a:r>
+            <a:r>
+              <a:rPr lang="en-US" dirty="0" smtClean="0"/>
+              <a:t> year </a:t>
+            </a:r>
+            <a:r>
+              <a:rPr lang="en-US" dirty="0"/>
+              <a:t>Linguistics and Computer </a:t>
+            </a:r>
+            <a:r>
+              <a:rPr lang="en-US" dirty="0" smtClean="0"/>
+              <a:t>Science major. This summer Carol interned at</a:t>
+            </a:r>
+            <a:r>
+              <a:rPr lang="en-US" dirty="0"/>
+              <a:t> </a:t>
+            </a:r>
+            <a:r>
+              <a:rPr lang="en-US" dirty="0" smtClean="0"/>
+              <a:t>the USC </a:t>
+            </a:r>
+            <a:r>
+              <a:rPr lang="en-US" dirty="0"/>
+              <a:t>Institute for Creative Technologies </a:t>
+            </a:r>
+            <a:r>
+              <a:rPr lang="en-US" dirty="0" smtClean="0"/>
+              <a:t>and worked </a:t>
+            </a:r>
+            <a:r>
+              <a:rPr lang="en-US" dirty="0"/>
+              <a:t>under the Virtual Acquisition Career Guide project</a:t>
+            </a:r>
+            <a:r>
+              <a:rPr lang="en-US" dirty="0" smtClean="0"/>
+              <a:t>. She is </a:t>
+            </a:r>
+            <a:r>
+              <a:rPr lang="en-US" smtClean="0"/>
+              <a:t>currently working as an </a:t>
+            </a:r>
+            <a:r>
+              <a:rPr lang="en-US" dirty="0"/>
+              <a:t>a</a:t>
+            </a:r>
+            <a:r>
+              <a:rPr lang="en-US" smtClean="0"/>
+              <a:t>nnotator </a:t>
+            </a:r>
+            <a:r>
+              <a:rPr lang="en-US" dirty="0"/>
+              <a:t>for the Natural Language and Dialogue Systems Lab. </a:t>
+            </a:r>
+          </a:p>
+          <a:p>
+            <a:endParaRPr lang="en-US" dirty="0"/>
+          </a:p>
+        </p:txBody>
+      </p:sp>
+    </p:spTree>
+    <p:extLst>
+      <p:ext uri="{BB962C8B-B14F-4D97-AF65-F5344CB8AC3E}">
+        <p14:creationId xmlns:p14="http://schemas.microsoft.com/office/powerpoint/2010/main" val="3130356690"/>
+      </p:ext>
+    </p:extLst>
+  </p:cSld>
+  <p:clrMapOvr>
+    <a:masterClrMapping/>
+  </p:clrMapOvr>
+  <p:transition xmlns:p14="http://schemas.microsoft.com/office/powerpoint/2010/main" spd="med"/>
 </p:sld>
 </file>
 

</xml_diff>